<commit_message>
update day 1 presentation and correct reproject text
</commit_message>
<xml_diff>
--- a/doc/BCB_Intro_Raster_2022.pptx
+++ b/doc/BCB_Intro_Raster_2022.pptx
@@ -237,7 +237,7 @@
           <a:p>
             <a:fld id="{8B3D4395-F4BB-4776-AD1A-E1F7520CF444}" type="datetimeFigureOut">
               <a:rPr lang="en-US" smtClean="0"/>
-              <a:t>4/21/2022</a:t>
+              <a:t>4/25/2022</a:t>
             </a:fld>
             <a:endParaRPr lang="en-US" dirty="0"/>
           </a:p>
@@ -2738,7 +2738,7 @@
           <a:lstStyle/>
           <a:p>
             <a:r>
-              <a:rPr lang="en-US" dirty="0"/>
+              <a:rPr lang="en-US" b="1" dirty="0"/>
               <a:t>Introduction to Raster data</a:t>
             </a:r>
           </a:p>
@@ -2944,7 +2944,7 @@
           <a:lstStyle/>
           <a:p>
             <a:r>
-              <a:rPr lang="en-US" dirty="0"/>
+              <a:rPr lang="en-US" b="1" dirty="0"/>
               <a:t>Continuous vs categorical</a:t>
             </a:r>
           </a:p>
@@ -3107,14 +3107,14 @@
           <a:lstStyle/>
           <a:p>
             <a:r>
-              <a:rPr lang="en-US" dirty="0"/>
+              <a:rPr lang="en-US" b="1" dirty="0"/>
               <a:t>Important aspects to </a:t>
             </a:r>
             <a:r>
-              <a:rPr lang="en-US" dirty="0" err="1"/>
+              <a:rPr lang="en-US" b="1" dirty="0" err="1"/>
               <a:t>rasters</a:t>
             </a:r>
-            <a:endParaRPr lang="en-US" dirty="0"/>
+            <a:endParaRPr lang="en-US" b="1" dirty="0"/>
           </a:p>
         </p:txBody>
       </p:sp>
@@ -3331,14 +3331,14 @@
           <a:lstStyle/>
           <a:p>
             <a:r>
-              <a:rPr lang="en-US" dirty="0"/>
+              <a:rPr lang="en-US" b="1" dirty="0"/>
               <a:t>Important aspects to </a:t>
             </a:r>
             <a:r>
-              <a:rPr lang="en-US" dirty="0" err="1"/>
+              <a:rPr lang="en-US" b="1" dirty="0" err="1"/>
               <a:t>rasters</a:t>
             </a:r>
-            <a:endParaRPr lang="en-US" dirty="0"/>
+            <a:endParaRPr lang="en-US" b="1" dirty="0"/>
           </a:p>
         </p:txBody>
       </p:sp>
@@ -3547,14 +3547,14 @@
           <a:lstStyle/>
           <a:p>
             <a:r>
-              <a:rPr lang="en-US" dirty="0"/>
+              <a:rPr lang="en-US" b="1" dirty="0"/>
               <a:t>Important aspects to </a:t>
             </a:r>
             <a:r>
-              <a:rPr lang="en-US" dirty="0" err="1"/>
+              <a:rPr lang="en-US" b="1" dirty="0" err="1"/>
               <a:t>rasters</a:t>
             </a:r>
-            <a:endParaRPr lang="en-US" dirty="0"/>
+            <a:endParaRPr lang="en-US" b="1" dirty="0"/>
           </a:p>
         </p:txBody>
       </p:sp>
@@ -3774,8 +3774,8 @@
           <a:lstStyle/>
           <a:p>
             <a:r>
-              <a:rPr lang="en-US" dirty="0"/>
-              <a:t>Multi-band/multi-spectral data</a:t>
+              <a:rPr lang="en-US" b="1" dirty="0"/>
+              <a:t>Multi-band data</a:t>
             </a:r>
           </a:p>
         </p:txBody>
@@ -3994,8 +3994,8 @@
           <a:lstStyle/>
           <a:p>
             <a:r>
-              <a:rPr lang="en-US" dirty="0"/>
-              <a:t>Coordinate Reference Systems</a:t>
+              <a:rPr lang="en-US" b="1" dirty="0"/>
+              <a:t>Coordinate Ref Systems</a:t>
             </a:r>
           </a:p>
         </p:txBody>
@@ -4192,9 +4192,10 @@
           <a:lstStyle/>
           <a:p>
             <a:r>
-              <a:rPr lang="en-US" dirty="0"/>
-              <a:t>Coordinate Reference Systems</a:t>
-            </a:r>
+              <a:rPr lang="en-US" b="1" dirty="0"/>
+              <a:t>Coordinate Ref Systems</a:t>
+            </a:r>
+            <a:endParaRPr lang="en-US" dirty="0"/>
           </a:p>
         </p:txBody>
       </p:sp>
@@ -4560,9 +4561,10 @@
           <a:lstStyle/>
           <a:p>
             <a:r>
-              <a:rPr lang="en-US" dirty="0"/>
-              <a:t>Coordinate Reference Systems</a:t>
-            </a:r>
+              <a:rPr lang="en-US" b="1" dirty="0"/>
+              <a:t>Coordinate Ref Systems</a:t>
+            </a:r>
+            <a:endParaRPr lang="en-US" dirty="0"/>
           </a:p>
         </p:txBody>
       </p:sp>
@@ -4923,9 +4925,10 @@
           <a:lstStyle/>
           <a:p>
             <a:r>
-              <a:rPr lang="en-US" dirty="0"/>
-              <a:t>Coordinate Reference Systems</a:t>
-            </a:r>
+              <a:rPr lang="en-US" b="1" dirty="0"/>
+              <a:t>Coordinate Ref Systems</a:t>
+            </a:r>
+            <a:endParaRPr lang="en-US" dirty="0"/>
           </a:p>
         </p:txBody>
       </p:sp>
@@ -5257,17 +5260,6 @@
             </a:pPr>
             <a:r>
               <a:rPr lang="en-US" sz="1800" dirty="0"/>
-              <a:t>Welcome to the quarantine zone! </a:t>
-            </a:r>
-          </a:p>
-          <a:p>
-            <a:pPr marL="285750" lvl="1" indent="-285750">
-              <a:lnSpc>
-                <a:spcPts val="2160"/>
-              </a:lnSpc>
-            </a:pPr>
-            <a:r>
-              <a:rPr lang="en-US" sz="1800" dirty="0"/>
               <a:t>Instructor Introductions</a:t>
             </a:r>
           </a:p>
@@ -6123,7 +6115,7 @@
           <a:lstStyle/>
           <a:p>
             <a:r>
-              <a:rPr lang="en-US" dirty="0"/>
+              <a:rPr lang="en-US" b="1" dirty="0"/>
               <a:t>miscellaneous</a:t>
             </a:r>
           </a:p>
@@ -6295,7 +6287,10 @@
           <a:bodyPr/>
           <a:lstStyle/>
           <a:p>
-            <a:endParaRPr lang="en-US"/>
+            <a:r>
+              <a:rPr lang="en-US" b="1" dirty="0"/>
+              <a:t>Data download</a:t>
+            </a:r>
           </a:p>
         </p:txBody>
       </p:sp>
@@ -6320,7 +6315,13 @@
           <a:bodyPr/>
           <a:lstStyle/>
           <a:p>
-            <a:endParaRPr lang="en-US"/>
+            <a:r>
+              <a:rPr lang="en-US" dirty="0"/>
+              <a:t>BCB503 Geospatial Workshop</a:t>
+            </a:r>
+          </a:p>
+          <a:p>
+            <a:endParaRPr lang="en-US" dirty="0"/>
           </a:p>
         </p:txBody>
       </p:sp>
@@ -6343,7 +6344,7 @@
         <p:spPr>
           <a:xfrm>
             <a:off x="374493" y="1339135"/>
-            <a:ext cx="8229600" cy="2288381"/>
+            <a:ext cx="8185958" cy="2288381"/>
           </a:xfrm>
         </p:spPr>
         <p:txBody>
@@ -6368,12 +6369,12 @@
               <a:rPr lang="en-US" dirty="0">
                 <a:hlinkClick r:id="rId2"/>
               </a:rPr>
-              <a:t>https://drive.google.com/file/d/1gm2aWOFBUSC6FiBcXN2WRCA--6eq5_ZG/view?usp=sharing</a:t>
-            </a:r>
-            <a:endParaRPr lang="en-US" dirty="0"/>
-          </a:p>
-          <a:p>
-            <a:endParaRPr lang="en-US" dirty="0"/>
+              <a:t>https://bit.ly/3OLTfzA</a:t>
+            </a:r>
+            <a:r>
+              <a:rPr lang="en-US" dirty="0"/>
+              <a:t> </a:t>
+            </a:r>
           </a:p>
         </p:txBody>
       </p:sp>
@@ -6429,7 +6430,7 @@
           <a:lstStyle/>
           <a:p>
             <a:r>
-              <a:rPr lang="en-US" dirty="0"/>
+              <a:rPr lang="en-US" b="1" dirty="0"/>
               <a:t>Introduction to Raster data</a:t>
             </a:r>
           </a:p>
@@ -6629,7 +6630,7 @@
           <a:lstStyle/>
           <a:p>
             <a:r>
-              <a:rPr lang="en-US" dirty="0"/>
+              <a:rPr lang="en-US" b="1" dirty="0"/>
               <a:t>Introduction to Raster data</a:t>
             </a:r>
           </a:p>

</xml_diff>